<commit_message>
added more search criteria and printout for s2
</commit_message>
<xml_diff>
--- a/scenario2/recording/T101389-Scenario2-v20210920.pptx
+++ b/scenario2/recording/T101389-Scenario2-v20210920.pptx
@@ -4807,8 +4807,8 @@
         </p:nvSpPr>
         <p:spPr>
           <a:xfrm>
-            <a:off x="3705398" y="343192"/>
-            <a:ext cx="6097384" cy="369332"/>
+            <a:off x="2358737" y="6195912"/>
+            <a:ext cx="8019877" cy="369332"/>
           </a:xfrm>
           <a:prstGeom prst="rect">
             <a:avLst/>
@@ -4823,7 +4823,7 @@
           <a:p>
             <a:r>
               <a:rPr lang="en-US" dirty="0"/>
-              <a:t>T101389-10005: 00c54e200e0d868faac8c55bfca70dbe.jpg</a:t>
+              <a:t>u2-id = T101389-10005:  filename = 00c54e200e0d868faac8c55bfca70dbe.jpg</a:t>
             </a:r>
           </a:p>
         </p:txBody>

</xml_diff>